<commit_message>
Updated DJIT+ example (without data race)
</commit_message>
<xml_diff>
--- a/Presentation.pptx
+++ b/Presentation.pptx
@@ -220,7 +220,7 @@
           <a:p>
             <a:fld id="{AE4F08AE-2D5D-614C-99F4-4311ED5A9735}" type="datetimeFigureOut">
               <a:rPr lang="en-DE" smtClean="0"/>
-              <a:t>01.12.22</a:t>
+              <a:t>02.12.22</a:t>
             </a:fld>
             <a:endParaRPr lang="en-DE"/>
           </a:p>
@@ -889,7 +889,7 @@
           <a:p>
             <a:fld id="{4BA10958-B0C9-CB4A-ACA1-F029D988F966}" type="datetimeFigureOut">
               <a:rPr lang="en-DE" smtClean="0"/>
-              <a:t>01.12.22</a:t>
+              <a:t>02.12.22</a:t>
             </a:fld>
             <a:endParaRPr lang="en-DE"/>
           </a:p>
@@ -1089,7 +1089,7 @@
           <a:p>
             <a:fld id="{4BA10958-B0C9-CB4A-ACA1-F029D988F966}" type="datetimeFigureOut">
               <a:rPr lang="en-DE" smtClean="0"/>
-              <a:t>01.12.22</a:t>
+              <a:t>02.12.22</a:t>
             </a:fld>
             <a:endParaRPr lang="en-DE"/>
           </a:p>
@@ -1299,7 +1299,7 @@
           <a:p>
             <a:fld id="{4BA10958-B0C9-CB4A-ACA1-F029D988F966}" type="datetimeFigureOut">
               <a:rPr lang="en-DE" smtClean="0"/>
-              <a:t>01.12.22</a:t>
+              <a:t>02.12.22</a:t>
             </a:fld>
             <a:endParaRPr lang="en-DE"/>
           </a:p>
@@ -1499,7 +1499,7 @@
           <a:p>
             <a:fld id="{4BA10958-B0C9-CB4A-ACA1-F029D988F966}" type="datetimeFigureOut">
               <a:rPr lang="en-DE" smtClean="0"/>
-              <a:t>01.12.22</a:t>
+              <a:t>02.12.22</a:t>
             </a:fld>
             <a:endParaRPr lang="en-DE"/>
           </a:p>
@@ -1775,7 +1775,7 @@
           <a:p>
             <a:fld id="{4BA10958-B0C9-CB4A-ACA1-F029D988F966}" type="datetimeFigureOut">
               <a:rPr lang="en-DE" smtClean="0"/>
-              <a:t>01.12.22</a:t>
+              <a:t>02.12.22</a:t>
             </a:fld>
             <a:endParaRPr lang="en-DE"/>
           </a:p>
@@ -2043,7 +2043,7 @@
           <a:p>
             <a:fld id="{4BA10958-B0C9-CB4A-ACA1-F029D988F966}" type="datetimeFigureOut">
               <a:rPr lang="en-DE" smtClean="0"/>
-              <a:t>01.12.22</a:t>
+              <a:t>02.12.22</a:t>
             </a:fld>
             <a:endParaRPr lang="en-DE"/>
           </a:p>
@@ -2458,7 +2458,7 @@
           <a:p>
             <a:fld id="{4BA10958-B0C9-CB4A-ACA1-F029D988F966}" type="datetimeFigureOut">
               <a:rPr lang="en-DE" smtClean="0"/>
-              <a:t>01.12.22</a:t>
+              <a:t>02.12.22</a:t>
             </a:fld>
             <a:endParaRPr lang="en-DE"/>
           </a:p>
@@ -2600,7 +2600,7 @@
           <a:p>
             <a:fld id="{4BA10958-B0C9-CB4A-ACA1-F029D988F966}" type="datetimeFigureOut">
               <a:rPr lang="en-DE" smtClean="0"/>
-              <a:t>01.12.22</a:t>
+              <a:t>02.12.22</a:t>
             </a:fld>
             <a:endParaRPr lang="en-DE"/>
           </a:p>
@@ -2713,7 +2713,7 @@
           <a:p>
             <a:fld id="{4BA10958-B0C9-CB4A-ACA1-F029D988F966}" type="datetimeFigureOut">
               <a:rPr lang="en-DE" smtClean="0"/>
-              <a:t>01.12.22</a:t>
+              <a:t>02.12.22</a:t>
             </a:fld>
             <a:endParaRPr lang="en-DE"/>
           </a:p>
@@ -3026,7 +3026,7 @@
           <a:p>
             <a:fld id="{4BA10958-B0C9-CB4A-ACA1-F029D988F966}" type="datetimeFigureOut">
               <a:rPr lang="en-DE" smtClean="0"/>
-              <a:t>01.12.22</a:t>
+              <a:t>02.12.22</a:t>
             </a:fld>
             <a:endParaRPr lang="en-DE"/>
           </a:p>
@@ -3315,7 +3315,7 @@
           <a:p>
             <a:fld id="{4BA10958-B0C9-CB4A-ACA1-F029D988F966}" type="datetimeFigureOut">
               <a:rPr lang="en-DE" smtClean="0"/>
-              <a:t>01.12.22</a:t>
+              <a:t>02.12.22</a:t>
             </a:fld>
             <a:endParaRPr lang="en-DE"/>
           </a:p>
@@ -3558,7 +3558,7 @@
           <a:p>
             <a:fld id="{4BA10958-B0C9-CB4A-ACA1-F029D988F966}" type="datetimeFigureOut">
               <a:rPr lang="en-DE" smtClean="0"/>
-              <a:t>01.12.22</a:t>
+              <a:t>02.12.22</a:t>
             </a:fld>
             <a:endParaRPr lang="en-DE"/>
           </a:p>
@@ -7080,7 +7080,7 @@
               <a:pPr algn="ctr"/>
               <a:r>
                 <a:rPr lang="en-DE" dirty="0"/>
-                <a:t>0</a:t>
+                <a:t>1</a:t>
               </a:r>
             </a:p>
           </p:txBody>
@@ -7127,7 +7127,7 @@
               <a:pPr algn="ctr"/>
               <a:r>
                 <a:rPr lang="en-DE" dirty="0"/>
-                <a:t>0</a:t>
+                <a:t>1</a:t>
               </a:r>
             </a:p>
           </p:txBody>
@@ -7174,7 +7174,7 @@
               <a:pPr algn="ctr"/>
               <a:r>
                 <a:rPr lang="en-DE" dirty="0"/>
-                <a:t>0</a:t>
+                <a:t>1</a:t>
               </a:r>
             </a:p>
           </p:txBody>
@@ -7242,7 +7242,7 @@
               <a:pPr algn="ctr"/>
               <a:r>
                 <a:rPr lang="en-DE" dirty="0"/>
-                <a:t>0</a:t>
+                <a:t>1</a:t>
               </a:r>
             </a:p>
           </p:txBody>
@@ -7289,7 +7289,7 @@
               <a:pPr algn="ctr"/>
               <a:r>
                 <a:rPr lang="en-DE" dirty="0"/>
-                <a:t>0</a:t>
+                <a:t>1</a:t>
               </a:r>
             </a:p>
           </p:txBody>
@@ -7336,7 +7336,7 @@
               <a:pPr algn="ctr"/>
               <a:r>
                 <a:rPr lang="en-DE" dirty="0"/>
-                <a:t>0</a:t>
+                <a:t>1</a:t>
               </a:r>
             </a:p>
           </p:txBody>
@@ -8031,7 +8031,7 @@
               <a:pPr algn="ctr"/>
               <a:r>
                 <a:rPr lang="en-DE" dirty="0"/>
-                <a:t>0</a:t>
+                <a:t>1</a:t>
               </a:r>
             </a:p>
           </p:txBody>
@@ -8078,7 +8078,7 @@
               <a:pPr algn="ctr"/>
               <a:r>
                 <a:rPr lang="en-DE" dirty="0"/>
-                <a:t>0</a:t>
+                <a:t>1</a:t>
               </a:r>
             </a:p>
           </p:txBody>
@@ -8858,7 +8858,7 @@
               <a:pPr algn="ctr"/>
               <a:r>
                 <a:rPr lang="en-DE" dirty="0"/>
-                <a:t>0</a:t>
+                <a:t>1</a:t>
               </a:r>
             </a:p>
           </p:txBody>
@@ -8905,7 +8905,7 @@
               <a:pPr algn="ctr"/>
               <a:r>
                 <a:rPr lang="en-DE" dirty="0"/>
-                <a:t>0</a:t>
+                <a:t>1</a:t>
               </a:r>
             </a:p>
           </p:txBody>
@@ -9203,7 +9203,7 @@
               <a:pPr algn="ctr"/>
               <a:r>
                 <a:rPr lang="en-DE" dirty="0"/>
-                <a:t>1</a:t>
+                <a:t>2</a:t>
               </a:r>
             </a:p>
           </p:txBody>
@@ -9480,7 +9480,7 @@
               <a:pPr algn="ctr"/>
               <a:r>
                 <a:rPr lang="en-DE" dirty="0"/>
-                <a:t>0</a:t>
+                <a:t>2</a:t>
               </a:r>
             </a:p>
           </p:txBody>
@@ -9548,7 +9548,7 @@
               <a:pPr algn="ctr"/>
               <a:r>
                 <a:rPr lang="en-DE" dirty="0"/>
-                <a:t>0</a:t>
+                <a:t>2</a:t>
               </a:r>
             </a:p>
           </p:txBody>
@@ -9710,7 +9710,7 @@
               <a:pPr algn="ctr"/>
               <a:r>
                 <a:rPr lang="en-DE" dirty="0"/>
-                <a:t>2</a:t>
+                <a:t>3</a:t>
               </a:r>
             </a:p>
           </p:txBody>

</xml_diff>